<commit_message>
Updated the presentation slides and added the mockup program to docs.
</commit_message>
<xml_diff>
--- a/docs/Pres 1.pptx
+++ b/docs/Pres 1.pptx
@@ -107,6 +107,11 @@
       </a:defRPr>
     </a:lvl9pPr>
   </p:defaultTextStyle>
+  <p:extLst>
+    <p:ext uri="{EFAFB233-063F-42B5-8137-9DF3F51BA10A}">
+      <p15:sldGuideLst xmlns:p15="http://schemas.microsoft.com/office/powerpoint/2012/main"/>
+    </p:ext>
+  </p:extLst>
 </p:presentation>
 </file>
 
@@ -3282,7 +3287,7 @@
           <a:p>
             <a:fld id="{3C2B07E4-CDF9-4C88-A2F3-04620E58224D}" type="datetimeFigureOut">
               <a:rPr lang="en-US" smtClean="0"/>
-              <a:t>10/17/2022</a:t>
+              <a:t>10/19/2022</a:t>
             </a:fld>
             <a:endParaRPr lang="en-US"/>
           </a:p>
@@ -3572,7 +3577,7 @@
           <a:p>
             <a:fld id="{3C2B07E4-CDF9-4C88-A2F3-04620E58224D}" type="datetimeFigureOut">
               <a:rPr lang="en-US" smtClean="0"/>
-              <a:t>10/17/2022</a:t>
+              <a:t>10/19/2022</a:t>
             </a:fld>
             <a:endParaRPr lang="en-US"/>
           </a:p>
@@ -3824,7 +3829,7 @@
           <a:p>
             <a:fld id="{3C2B07E4-CDF9-4C88-A2F3-04620E58224D}" type="datetimeFigureOut">
               <a:rPr lang="en-US" smtClean="0"/>
-              <a:t>10/17/2022</a:t>
+              <a:t>10/19/2022</a:t>
             </a:fld>
             <a:endParaRPr lang="en-US"/>
           </a:p>
@@ -4076,7 +4081,7 @@
           <a:p>
             <a:fld id="{3C2B07E4-CDF9-4C88-A2F3-04620E58224D}" type="datetimeFigureOut">
               <a:rPr lang="en-US" smtClean="0"/>
-              <a:t>10/17/2022</a:t>
+              <a:t>10/19/2022</a:t>
             </a:fld>
             <a:endParaRPr lang="en-US"/>
           </a:p>
@@ -4405,7 +4410,7 @@
           <a:p>
             <a:fld id="{3C2B07E4-CDF9-4C88-A2F3-04620E58224D}" type="datetimeFigureOut">
               <a:rPr lang="en-US" smtClean="0"/>
-              <a:t>10/17/2022</a:t>
+              <a:t>10/19/2022</a:t>
             </a:fld>
             <a:endParaRPr lang="en-US"/>
           </a:p>
@@ -4755,7 +4760,7 @@
           <a:p>
             <a:fld id="{3C2B07E4-CDF9-4C88-A2F3-04620E58224D}" type="datetimeFigureOut">
               <a:rPr lang="en-US" smtClean="0"/>
-              <a:t>10/17/2022</a:t>
+              <a:t>10/19/2022</a:t>
             </a:fld>
             <a:endParaRPr lang="en-US"/>
           </a:p>
@@ -5267,7 +5272,7 @@
           <a:p>
             <a:fld id="{3C2B07E4-CDF9-4C88-A2F3-04620E58224D}" type="datetimeFigureOut">
               <a:rPr lang="en-US" smtClean="0"/>
-              <a:t>10/17/2022</a:t>
+              <a:t>10/19/2022</a:t>
             </a:fld>
             <a:endParaRPr lang="en-US"/>
           </a:p>
@@ -5595,7 +5600,7 @@
           <a:p>
             <a:fld id="{3C2B07E4-CDF9-4C88-A2F3-04620E58224D}" type="datetimeFigureOut">
               <a:rPr lang="en-US" smtClean="0"/>
-              <a:t>10/17/2022</a:t>
+              <a:t>10/19/2022</a:t>
             </a:fld>
             <a:endParaRPr lang="en-US"/>
           </a:p>
@@ -5708,7 +5713,7 @@
           <a:p>
             <a:fld id="{3C2B07E4-CDF9-4C88-A2F3-04620E58224D}" type="datetimeFigureOut">
               <a:rPr lang="en-US" smtClean="0"/>
-              <a:t>10/17/2022</a:t>
+              <a:t>10/19/2022</a:t>
             </a:fld>
             <a:endParaRPr lang="en-US"/>
           </a:p>
@@ -6049,7 +6054,7 @@
           <a:p>
             <a:fld id="{3C2B07E4-CDF9-4C88-A2F3-04620E58224D}" type="datetimeFigureOut">
               <a:rPr lang="en-US" smtClean="0"/>
-              <a:t>10/17/2022</a:t>
+              <a:t>10/19/2022</a:t>
             </a:fld>
             <a:endParaRPr lang="en-US"/>
           </a:p>
@@ -6349,7 +6354,7 @@
           <a:p>
             <a:fld id="{3C2B07E4-CDF9-4C88-A2F3-04620E58224D}" type="datetimeFigureOut">
               <a:rPr lang="en-US" smtClean="0"/>
-              <a:t>10/17/2022</a:t>
+              <a:t>10/19/2022</a:t>
             </a:fld>
             <a:endParaRPr lang="en-US"/>
           </a:p>
@@ -6589,7 +6594,7 @@
             <a:fld id="{3C2B07E4-CDF9-4C88-A2F3-04620E58224D}" type="datetimeFigureOut">
               <a:rPr lang="en-US" smtClean="0"/>
               <a:pPr/>
-              <a:t>10/17/2022</a:t>
+              <a:t>10/19/2022</a:t>
             </a:fld>
             <a:endParaRPr lang="en-US" dirty="0"/>
           </a:p>
@@ -7763,53 +7768,6 @@
           </a:p>
         </p:txBody>
       </p:sp>
-      <p:pic>
-        <p:nvPicPr>
-          <p:cNvPr id="5" name="Picture 4" descr="54,552 Placeholder Images, Stock Photos &amp; Vectors | Shutterstock">
-            <a:extLst>
-              <a:ext uri="{FF2B5EF4-FFF2-40B4-BE49-F238E27FC236}">
-                <a16:creationId xmlns:a16="http://schemas.microsoft.com/office/drawing/2014/main" id="{FA891A6B-BDF3-ED11-4C74-E439F37FDCBC}"/>
-              </a:ext>
-            </a:extLst>
-          </p:cNvPr>
-          <p:cNvPicPr>
-            <a:picLocks noChangeAspect="1" noChangeArrowheads="1"/>
-          </p:cNvPicPr>
-          <p:nvPr/>
-        </p:nvPicPr>
-        <p:blipFill>
-          <a:blip r:embed="rId2">
-            <a:extLst>
-              <a:ext uri="{28A0092B-C50C-407E-A947-70E740481C1C}">
-                <a14:useLocalDpi xmlns:a14="http://schemas.microsoft.com/office/drawing/2010/main" val="0"/>
-              </a:ext>
-            </a:extLst>
-          </a:blip>
-          <a:srcRect/>
-          <a:stretch>
-            <a:fillRect/>
-          </a:stretch>
-        </p:blipFill>
-        <p:spPr bwMode="auto">
-          <a:xfrm>
-            <a:off x="6316664" y="1578425"/>
-            <a:ext cx="4905489" cy="3692303"/>
-          </a:xfrm>
-          <a:prstGeom prst="rect">
-            <a:avLst/>
-          </a:prstGeom>
-          <a:noFill/>
-          <a:extLst>
-            <a:ext uri="{909E8E84-426E-40DD-AFC4-6F175D3DCCD1}">
-              <a14:hiddenFill xmlns:a14="http://schemas.microsoft.com/office/drawing/2010/main">
-                <a:solidFill>
-                  <a:srgbClr val="FFFFFF"/>
-                </a:solidFill>
-              </a14:hiddenFill>
-            </a:ext>
-          </a:extLst>
-        </p:spPr>
-      </p:pic>
       <p:sp>
         <p:nvSpPr>
           <p:cNvPr id="6" name="TextBox 5">
@@ -7899,7 +7857,7 @@
           <p:nvPr/>
         </p:nvPicPr>
         <p:blipFill>
-          <a:blip r:embed="rId3">
+          <a:blip r:embed="rId2">
             <a:extLst>
               <a:ext uri="{28A0092B-C50C-407E-A947-70E740481C1C}">
                 <a14:useLocalDpi xmlns:a14="http://schemas.microsoft.com/office/drawing/2010/main" val="0"/>
@@ -7914,6 +7872,42 @@
           <a:xfrm>
             <a:off x="968290" y="1591611"/>
             <a:ext cx="4905490" cy="3679117"/>
+          </a:xfrm>
+          <a:prstGeom prst="rect">
+            <a:avLst/>
+          </a:prstGeom>
+        </p:spPr>
+      </p:pic>
+      <p:pic>
+        <p:nvPicPr>
+          <p:cNvPr id="4" name="Picture 3">
+            <a:extLst>
+              <a:ext uri="{FF2B5EF4-FFF2-40B4-BE49-F238E27FC236}">
+                <a16:creationId xmlns:a16="http://schemas.microsoft.com/office/drawing/2014/main" id="{E9ACE7DA-F34C-03E5-1363-347D627960B3}"/>
+              </a:ext>
+            </a:extLst>
+          </p:cNvPr>
+          <p:cNvPicPr>
+            <a:picLocks noChangeAspect="1"/>
+          </p:cNvPicPr>
+          <p:nvPr/>
+        </p:nvPicPr>
+        <p:blipFill>
+          <a:blip r:embed="rId3">
+            <a:extLst>
+              <a:ext uri="{28A0092B-C50C-407E-A947-70E740481C1C}">
+                <a14:useLocalDpi xmlns:a14="http://schemas.microsoft.com/office/drawing/2010/main" val="0"/>
+              </a:ext>
+            </a:extLst>
+          </a:blip>
+          <a:stretch>
+            <a:fillRect/>
+          </a:stretch>
+        </p:blipFill>
+        <p:spPr>
+          <a:xfrm>
+            <a:off x="7344345" y="1253301"/>
+            <a:ext cx="2850127" cy="4351397"/>
           </a:xfrm>
           <a:prstGeom prst="rect">
             <a:avLst/>

</xml_diff>